<commit_message>
Code for 4th class..
</commit_message>
<xml_diff>
--- a/presentation/Core Java - class 3.pptx
+++ b/presentation/Core Java - class 3.pptx
@@ -294,7 +294,7 @@
           <a:p>
             <a:fld id="{C16A44AD-83F4-464E-80F9-B1E8DD104582}" type="datetimeFigureOut">
               <a:rPr lang="en-US" smtClean="0"/>
-              <a:t>2/4/16</a:t>
+              <a:t>2/5/16</a:t>
             </a:fld>
             <a:endParaRPr lang="en-US"/>
           </a:p>
@@ -464,7 +464,7 @@
           <a:p>
             <a:fld id="{C16A44AD-83F4-464E-80F9-B1E8DD104582}" type="datetimeFigureOut">
               <a:rPr lang="en-US" smtClean="0"/>
-              <a:t>2/4/16</a:t>
+              <a:t>2/5/16</a:t>
             </a:fld>
             <a:endParaRPr lang="en-US"/>
           </a:p>
@@ -644,7 +644,7 @@
           <a:p>
             <a:fld id="{C16A44AD-83F4-464E-80F9-B1E8DD104582}" type="datetimeFigureOut">
               <a:rPr lang="en-US" smtClean="0"/>
-              <a:t>2/4/16</a:t>
+              <a:t>2/5/16</a:t>
             </a:fld>
             <a:endParaRPr lang="en-US"/>
           </a:p>
@@ -814,7 +814,7 @@
           <a:p>
             <a:fld id="{C16A44AD-83F4-464E-80F9-B1E8DD104582}" type="datetimeFigureOut">
               <a:rPr lang="en-US" smtClean="0"/>
-              <a:t>2/4/16</a:t>
+              <a:t>2/5/16</a:t>
             </a:fld>
             <a:endParaRPr lang="en-US"/>
           </a:p>
@@ -1060,7 +1060,7 @@
           <a:p>
             <a:fld id="{C16A44AD-83F4-464E-80F9-B1E8DD104582}" type="datetimeFigureOut">
               <a:rPr lang="en-US" smtClean="0"/>
-              <a:t>2/4/16</a:t>
+              <a:t>2/5/16</a:t>
             </a:fld>
             <a:endParaRPr lang="en-US"/>
           </a:p>
@@ -1348,7 +1348,7 @@
           <a:p>
             <a:fld id="{C16A44AD-83F4-464E-80F9-B1E8DD104582}" type="datetimeFigureOut">
               <a:rPr lang="en-US" smtClean="0"/>
-              <a:t>2/4/16</a:t>
+              <a:t>2/5/16</a:t>
             </a:fld>
             <a:endParaRPr lang="en-US"/>
           </a:p>
@@ -1770,7 +1770,7 @@
           <a:p>
             <a:fld id="{C16A44AD-83F4-464E-80F9-B1E8DD104582}" type="datetimeFigureOut">
               <a:rPr lang="en-US" smtClean="0"/>
-              <a:t>2/4/16</a:t>
+              <a:t>2/5/16</a:t>
             </a:fld>
             <a:endParaRPr lang="en-US"/>
           </a:p>
@@ -1888,7 +1888,7 @@
           <a:p>
             <a:fld id="{C16A44AD-83F4-464E-80F9-B1E8DD104582}" type="datetimeFigureOut">
               <a:rPr lang="en-US" smtClean="0"/>
-              <a:t>2/4/16</a:t>
+              <a:t>2/5/16</a:t>
             </a:fld>
             <a:endParaRPr lang="en-US"/>
           </a:p>
@@ -1983,7 +1983,7 @@
           <a:p>
             <a:fld id="{C16A44AD-83F4-464E-80F9-B1E8DD104582}" type="datetimeFigureOut">
               <a:rPr lang="en-US" smtClean="0"/>
-              <a:t>2/4/16</a:t>
+              <a:t>2/5/16</a:t>
             </a:fld>
             <a:endParaRPr lang="en-US"/>
           </a:p>
@@ -2260,7 +2260,7 @@
           <a:p>
             <a:fld id="{C16A44AD-83F4-464E-80F9-B1E8DD104582}" type="datetimeFigureOut">
               <a:rPr lang="en-US" smtClean="0"/>
-              <a:t>2/4/16</a:t>
+              <a:t>2/5/16</a:t>
             </a:fld>
             <a:endParaRPr lang="en-US"/>
           </a:p>
@@ -2513,7 +2513,7 @@
           <a:p>
             <a:fld id="{C16A44AD-83F4-464E-80F9-B1E8DD104582}" type="datetimeFigureOut">
               <a:rPr lang="en-US" smtClean="0"/>
-              <a:t>2/4/16</a:t>
+              <a:t>2/5/16</a:t>
             </a:fld>
             <a:endParaRPr lang="en-US"/>
           </a:p>
@@ -2726,7 +2726,7 @@
           <a:p>
             <a:fld id="{C16A44AD-83F4-464E-80F9-B1E8DD104582}" type="datetimeFigureOut">
               <a:rPr lang="en-US" smtClean="0"/>
-              <a:t>2/4/16</a:t>
+              <a:t>2/5/16</a:t>
             </a:fld>
             <a:endParaRPr lang="en-US"/>
           </a:p>
@@ -3230,13 +3230,8 @@
             </a:r>
             <a:r>
               <a:rPr lang="en-US" dirty="0" smtClean="0"/>
-              <a:t> </a:t>
-            </a:r>
-            <a:r>
-              <a:rPr lang="en-US" smtClean="0"/>
-              <a:t>data types</a:t>
-            </a:r>
-            <a:endParaRPr lang="en-US" dirty="0" smtClean="0"/>
+              <a:t> data types</a:t>
+            </a:r>
           </a:p>
           <a:p>
             <a:r>
@@ -3264,10 +3259,13 @@
           </a:p>
           <a:p>
             <a:r>
-              <a:rPr lang="en-US" dirty="0" smtClean="0"/>
-              <a:t>OOPS - Polymorphism</a:t>
-            </a:r>
-            <a:endParaRPr lang="en-US" dirty="0"/>
+              <a:rPr lang="en-US" smtClean="0"/>
+              <a:t>OOPS </a:t>
+            </a:r>
+            <a:r>
+              <a:rPr lang="en-US" smtClean="0"/>
+              <a:t>– Polymorphism</a:t>
+            </a:r>
           </a:p>
         </p:txBody>
       </p:sp>
@@ -3410,37 +3408,24 @@
               <a:rPr lang="en-US" dirty="0" smtClean="0"/>
               <a:t>Integer age = new Integer(45); </a:t>
             </a:r>
-            <a:endParaRPr lang="en-US" dirty="0" smtClean="0"/>
           </a:p>
           <a:p>
             <a:pPr lvl="1"/>
             <a:r>
               <a:rPr lang="en-US" dirty="0" err="1" smtClean="0"/>
-              <a:t>i</a:t>
+              <a:t>int</a:t>
+            </a:r>
+            <a:r>
+              <a:rPr lang="en-US" dirty="0" smtClean="0"/>
+              <a:t> </a:t>
             </a:r>
             <a:r>
               <a:rPr lang="en-US" dirty="0" err="1" smtClean="0"/>
-              <a:t>nt</a:t>
-            </a:r>
-            <a:r>
-              <a:rPr lang="en-US" dirty="0" smtClean="0"/>
-              <a:t> </a:t>
-            </a:r>
-            <a:r>
-              <a:rPr lang="en-US" dirty="0" err="1" smtClean="0"/>
-              <a:t>anotherA</a:t>
-            </a:r>
-            <a:r>
-              <a:rPr lang="en-US" dirty="0" err="1" smtClean="0"/>
-              <a:t>ge</a:t>
-            </a:r>
-            <a:r>
-              <a:rPr lang="en-US" dirty="0" smtClean="0"/>
-              <a:t> </a:t>
-            </a:r>
-            <a:r>
-              <a:rPr lang="en-US" dirty="0" smtClean="0"/>
-              <a:t>= </a:t>
+              <a:t>anotherAge</a:t>
+            </a:r>
+            <a:r>
+              <a:rPr lang="en-US" dirty="0" smtClean="0"/>
+              <a:t> = </a:t>
             </a:r>
             <a:r>
               <a:rPr lang="en-US" dirty="0" err="1" smtClean="0"/>
@@ -3519,21 +3504,13 @@
             <a:pPr lvl="1"/>
             <a:r>
               <a:rPr lang="en-US" dirty="0" smtClean="0"/>
-              <a:t>There will not be set methods in these Object (more about how to do this after we learn Object Encapsulation</a:t>
-            </a:r>
-            <a:r>
-              <a:rPr lang="en-US" dirty="0" smtClean="0"/>
-              <a:t>)</a:t>
-            </a:r>
-          </a:p>
-          <a:p>
-            <a:r>
-              <a:rPr lang="en-US" dirty="0" smtClean="0"/>
-              <a:t>Wra</a:t>
-            </a:r>
-            <a:r>
-              <a:rPr lang="en-US" dirty="0" smtClean="0"/>
-              <a:t>pper Objects can have null values</a:t>
+              <a:t>There will not be set methods in these Object (more about how to do this after we learn Object Encapsulation)</a:t>
+            </a:r>
+          </a:p>
+          <a:p>
+            <a:r>
+              <a:rPr lang="en-US" dirty="0" smtClean="0"/>
+              <a:t>Wrapper Objects can have null values</a:t>
             </a:r>
             <a:endParaRPr lang="en-US" dirty="0"/>
           </a:p>
@@ -3725,11 +3702,7 @@
             </a:pPr>
             <a:r>
               <a:rPr lang="en-US" dirty="0" smtClean="0"/>
-              <a:t>Color </a:t>
-            </a:r>
-            <a:r>
-              <a:rPr lang="en-US" dirty="0" smtClean="0"/>
-              <a:t>color = </a:t>
+              <a:t>Color color = </a:t>
             </a:r>
             <a:r>
               <a:rPr lang="en-US" dirty="0" err="1" smtClean="0"/>
@@ -3739,7 +3712,6 @@
               <a:rPr lang="en-US" dirty="0" smtClean="0"/>
               <a:t>;</a:t>
             </a:r>
-            <a:endParaRPr lang="en-US" dirty="0" smtClean="0"/>
           </a:p>
           <a:p>
             <a:pPr marL="914400" lvl="2" indent="0">
@@ -3747,11 +3719,7 @@
             </a:pPr>
             <a:r>
               <a:rPr lang="en-US" dirty="0" smtClean="0"/>
-              <a:t>Gender </a:t>
-            </a:r>
-            <a:r>
-              <a:rPr lang="en-US" dirty="0" smtClean="0"/>
-              <a:t>gender  = </a:t>
+              <a:t>Gender gender  = </a:t>
             </a:r>
             <a:r>
               <a:rPr lang="en-US" dirty="0" err="1" smtClean="0"/>
@@ -3761,7 +3729,6 @@
               <a:rPr lang="en-US" dirty="0" smtClean="0"/>
               <a:t>;</a:t>
             </a:r>
-            <a:endParaRPr lang="en-US" dirty="0" smtClean="0"/>
           </a:p>
           <a:p>
             <a:pPr marL="457200" lvl="1" indent="0">

</xml_diff>